<commit_message>
:speech_balloon: Update bigO at tree traversal method
</commit_message>
<xml_diff>
--- a/09/yongki/Tree.pptx
+++ b/09/yongki/Tree.pptx
@@ -248,7 +248,7 @@
           <a:p>
             <a:fld id="{278A5395-7299-4714-9E5C-8983F2B9A6E7}" type="datetimeFigureOut">
               <a:rPr lang="ko-KR" altLang="en-US" smtClean="0"/>
-              <a:t>2022-04-28</a:t>
+              <a:t>2022-04-30</a:t>
             </a:fld>
             <a:endParaRPr lang="ko-KR" altLang="en-US"/>
           </a:p>
@@ -4816,10 +4816,10 @@
       </p:pic>
       <p:pic>
         <p:nvPicPr>
-          <p:cNvPr id="6" name="그림 5">
+          <p:cNvPr id="4" name="그림 3">
             <a:extLst>
               <a:ext uri="{FF2B5EF4-FFF2-40B4-BE49-F238E27FC236}">
-                <a16:creationId xmlns:a16="http://schemas.microsoft.com/office/drawing/2014/main" id="{B591F2CB-5905-4070-B124-78C98E662545}"/>
+                <a16:creationId xmlns:a16="http://schemas.microsoft.com/office/drawing/2014/main" id="{8B1000A9-A031-422D-994D-B44E4EC98625}"/>
               </a:ext>
             </a:extLst>
           </p:cNvPr>
@@ -4836,8 +4836,8 @@
         </p:blipFill>
         <p:spPr>
           <a:xfrm>
-            <a:off x="870394" y="3429000"/>
-            <a:ext cx="7403211" cy="2446824"/>
+            <a:off x="1185390" y="3501008"/>
+            <a:ext cx="6773220" cy="2229161"/>
           </a:xfrm>
           <a:prstGeom prst="rect">
             <a:avLst/>
@@ -5907,194 +5907,6 @@
           </a:p>
         </p:txBody>
       </p:sp>
-      <p:sp>
-        <p:nvSpPr>
-          <p:cNvPr id="21" name="TextBox 20">
-            <a:extLst>
-              <a:ext uri="{FF2B5EF4-FFF2-40B4-BE49-F238E27FC236}">
-                <a16:creationId xmlns:a16="http://schemas.microsoft.com/office/drawing/2014/main" id="{BE852A51-35C7-4CF3-9F2A-D63D682CC251}"/>
-              </a:ext>
-            </a:extLst>
-          </p:cNvPr>
-          <p:cNvSpPr txBox="1"/>
-          <p:nvPr/>
-        </p:nvSpPr>
-        <p:spPr>
-          <a:xfrm>
-            <a:off x="606082" y="3592389"/>
-            <a:ext cx="3270250" cy="369332"/>
-          </a:xfrm>
-          <a:prstGeom prst="rect">
-            <a:avLst/>
-          </a:prstGeom>
-          <a:noFill/>
-          <a:scene3d>
-            <a:camera prst="obliqueTopLeft"/>
-            <a:lightRig rig="threePt" dir="t"/>
-          </a:scene3d>
-        </p:spPr>
-        <p:txBody>
-          <a:bodyPr>
-            <a:spAutoFit/>
-          </a:bodyPr>
-          <a:lstStyle>
-            <a:defPPr>
-              <a:defRPr lang="ko-KR"/>
-            </a:defPPr>
-            <a:lvl1pPr>
-              <a:defRPr sz="2800" spc="-150">
-                <a:latin typeface="나눔스퀘어 ExtraBold" panose="020B0600000101010101" pitchFamily="50" charset="-127"/>
-                <a:ea typeface="나눔스퀘어 ExtraBold" panose="020B0600000101010101" pitchFamily="50" charset="-127"/>
-              </a:defRPr>
-            </a:lvl1pPr>
-          </a:lstStyle>
-          <a:p>
-            <a:pPr eaLnBrk="1" hangingPunct="1">
-              <a:defRPr/>
-            </a:pPr>
-            <a:r>
-              <a:rPr lang="en-US" altLang="ko-KR" sz="1800" b="1" dirty="0">
-                <a:latin typeface="맑은 고딕" panose="020B0503020000020004" pitchFamily="50" charset="-127"/>
-                <a:ea typeface="맑은 고딕" panose="020B0503020000020004" pitchFamily="50" charset="-127"/>
-                <a:cs typeface="Arial" panose="020B0604020202020204" pitchFamily="34" charset="0"/>
-              </a:rPr>
-              <a:t>3</a:t>
-            </a:r>
-            <a:endParaRPr lang="ko-KR" altLang="en-US" sz="1800" b="1" dirty="0">
-              <a:latin typeface="맑은 고딕" panose="020B0503020000020004" pitchFamily="50" charset="-127"/>
-              <a:ea typeface="맑은 고딕" panose="020B0503020000020004" pitchFamily="50" charset="-127"/>
-              <a:cs typeface="Arial" panose="020B0604020202020204" pitchFamily="34" charset="0"/>
-            </a:endParaRPr>
-          </a:p>
-        </p:txBody>
-      </p:sp>
-      <p:grpSp>
-        <p:nvGrpSpPr>
-          <p:cNvPr id="38" name="그룹 37">
-            <a:extLst>
-              <a:ext uri="{FF2B5EF4-FFF2-40B4-BE49-F238E27FC236}">
-                <a16:creationId xmlns:a16="http://schemas.microsoft.com/office/drawing/2014/main" id="{3284F333-6B3C-41AD-81EE-A6815B34E04F}"/>
-              </a:ext>
-            </a:extLst>
-          </p:cNvPr>
-          <p:cNvGrpSpPr/>
-          <p:nvPr/>
-        </p:nvGrpSpPr>
-        <p:grpSpPr>
-          <a:xfrm>
-            <a:off x="2422182" y="3580098"/>
-            <a:ext cx="7918450" cy="806150"/>
-            <a:chOff x="2422182" y="2274905"/>
-            <a:chExt cx="7918450" cy="806150"/>
-          </a:xfrm>
-        </p:grpSpPr>
-        <p:sp>
-          <p:nvSpPr>
-            <p:cNvPr id="41" name="TextBox 40">
-              <a:extLst>
-                <a:ext uri="{FF2B5EF4-FFF2-40B4-BE49-F238E27FC236}">
-                  <a16:creationId xmlns:a16="http://schemas.microsoft.com/office/drawing/2014/main" id="{CAB3C99E-089B-41EA-BC23-E2C664E10E8D}"/>
-                </a:ext>
-              </a:extLst>
-            </p:cNvPr>
-            <p:cNvSpPr txBox="1"/>
-            <p:nvPr/>
-          </p:nvSpPr>
-          <p:spPr>
-            <a:xfrm>
-              <a:off x="2422182" y="2274905"/>
-              <a:ext cx="4094034" cy="369332"/>
-            </a:xfrm>
-            <a:prstGeom prst="rect">
-              <a:avLst/>
-            </a:prstGeom>
-            <a:noFill/>
-            <a:scene3d>
-              <a:camera prst="obliqueTopLeft"/>
-              <a:lightRig rig="threePt" dir="t"/>
-            </a:scene3d>
-          </p:spPr>
-          <p:txBody>
-            <a:bodyPr wrap="square">
-              <a:spAutoFit/>
-            </a:bodyPr>
-            <a:lstStyle>
-              <a:defPPr>
-                <a:defRPr lang="ko-KR"/>
-              </a:defPPr>
-              <a:lvl1pPr>
-                <a:defRPr sz="2800" spc="-150">
-                  <a:latin typeface="나눔스퀘어 ExtraBold" panose="020B0600000101010101" pitchFamily="50" charset="-127"/>
-                  <a:ea typeface="나눔스퀘어 ExtraBold" panose="020B0600000101010101" pitchFamily="50" charset="-127"/>
-                </a:defRPr>
-              </a:lvl1pPr>
-            </a:lstStyle>
-            <a:p>
-              <a:pPr eaLnBrk="1" hangingPunct="1">
-                <a:defRPr/>
-              </a:pPr>
-              <a:endParaRPr lang="ko-KR" altLang="en-US" sz="1800" dirty="0">
-                <a:latin typeface="맑은 고딕" panose="020B0503020000020004" pitchFamily="50" charset="-127"/>
-                <a:ea typeface="맑은 고딕" panose="020B0503020000020004" pitchFamily="50" charset="-127"/>
-                <a:cs typeface="Arial" panose="020B0604020202020204" pitchFamily="34" charset="0"/>
-              </a:endParaRPr>
-            </a:p>
-          </p:txBody>
-        </p:sp>
-        <p:sp>
-          <p:nvSpPr>
-            <p:cNvPr id="42" name="TextBox 41">
-              <a:extLst>
-                <a:ext uri="{FF2B5EF4-FFF2-40B4-BE49-F238E27FC236}">
-                  <a16:creationId xmlns:a16="http://schemas.microsoft.com/office/drawing/2014/main" id="{D4BE8289-2002-4328-BF6E-03E596660CBD}"/>
-                </a:ext>
-              </a:extLst>
-            </p:cNvPr>
-            <p:cNvSpPr txBox="1"/>
-            <p:nvPr/>
-          </p:nvSpPr>
-          <p:spPr>
-            <a:xfrm>
-              <a:off x="2422182" y="2773278"/>
-              <a:ext cx="7918450" cy="307777"/>
-            </a:xfrm>
-            <a:prstGeom prst="rect">
-              <a:avLst/>
-            </a:prstGeom>
-            <a:noFill/>
-            <a:scene3d>
-              <a:camera prst="obliqueTopLeft"/>
-              <a:lightRig rig="threePt" dir="t"/>
-            </a:scene3d>
-          </p:spPr>
-          <p:txBody>
-            <a:bodyPr>
-              <a:spAutoFit/>
-            </a:bodyPr>
-            <a:lstStyle>
-              <a:defPPr>
-                <a:defRPr lang="ko-KR"/>
-              </a:defPPr>
-              <a:lvl1pPr>
-                <a:defRPr sz="2800" spc="-150">
-                  <a:latin typeface="나눔스퀘어 ExtraBold" panose="020B0600000101010101" pitchFamily="50" charset="-127"/>
-                  <a:ea typeface="나눔스퀘어 ExtraBold" panose="020B0600000101010101" pitchFamily="50" charset="-127"/>
-                </a:defRPr>
-              </a:lvl1pPr>
-            </a:lstStyle>
-            <a:p>
-              <a:pPr defTabSz="720000" eaLnBrk="1" hangingPunct="1">
-                <a:defRPr/>
-              </a:pPr>
-              <a:endParaRPr lang="ko-KR" altLang="en-US" sz="1400">
-                <a:latin typeface="맑은 고딕" panose="020B0503020000020004" pitchFamily="50" charset="-127"/>
-                <a:ea typeface="맑은 고딕" panose="020B0503020000020004" pitchFamily="50" charset="-127"/>
-                <a:cs typeface="Arial" panose="020B0604020202020204" pitchFamily="34" charset="0"/>
-              </a:endParaRPr>
-            </a:p>
-          </p:txBody>
-        </p:sp>
-      </p:grpSp>
     </p:spTree>
   </p:cSld>
   <p:clrMapOvr>

</xml_diff>